<commit_message>
final update - passed exam!
</commit_message>
<xml_diff>
--- a/LogSearcher.pptx
+++ b/LogSearcher.pptx
@@ -8,8 +8,8 @@
     <p:sldId id="256" r:id="rId2"/>
     <p:sldId id="275" r:id="rId3"/>
     <p:sldId id="257" r:id="rId4"/>
-    <p:sldId id="259" r:id="rId5"/>
-    <p:sldId id="260" r:id="rId6"/>
+    <p:sldId id="260" r:id="rId5"/>
+    <p:sldId id="259" r:id="rId6"/>
     <p:sldId id="261" r:id="rId7"/>
     <p:sldId id="265" r:id="rId8"/>
     <p:sldId id="262" r:id="rId9"/>
@@ -852,7 +852,7 @@
           <a:p>
             <a:fld id="{E4F54686-28C7-41F7-9FF9-CCD97C84AAF1}" type="datetimeFigureOut">
               <a:rPr lang="da-DK" smtClean="0"/>
-              <a:t>15-01-2023</a:t>
+              <a:t>16-01-2023</a:t>
             </a:fld>
             <a:endParaRPr lang="da-DK"/>
           </a:p>
@@ -1103,7 +1103,7 @@
           <a:p>
             <a:fld id="{E4F54686-28C7-41F7-9FF9-CCD97C84AAF1}" type="datetimeFigureOut">
               <a:rPr lang="da-DK" smtClean="0"/>
-              <a:t>15-01-2023</a:t>
+              <a:t>16-01-2023</a:t>
             </a:fld>
             <a:endParaRPr lang="da-DK"/>
           </a:p>
@@ -1417,7 +1417,7 @@
           <a:p>
             <a:fld id="{E4F54686-28C7-41F7-9FF9-CCD97C84AAF1}" type="datetimeFigureOut">
               <a:rPr lang="da-DK" smtClean="0"/>
-              <a:t>15-01-2023</a:t>
+              <a:t>16-01-2023</a:t>
             </a:fld>
             <a:endParaRPr lang="da-DK"/>
           </a:p>
@@ -1758,7 +1758,7 @@
           <a:p>
             <a:fld id="{E4F54686-28C7-41F7-9FF9-CCD97C84AAF1}" type="datetimeFigureOut">
               <a:rPr lang="da-DK" smtClean="0"/>
-              <a:t>15-01-2023</a:t>
+              <a:t>16-01-2023</a:t>
             </a:fld>
             <a:endParaRPr lang="da-DK"/>
           </a:p>
@@ -2072,7 +2072,7 @@
           <a:p>
             <a:fld id="{E4F54686-28C7-41F7-9FF9-CCD97C84AAF1}" type="datetimeFigureOut">
               <a:rPr lang="da-DK" smtClean="0"/>
-              <a:t>15-01-2023</a:t>
+              <a:t>16-01-2023</a:t>
             </a:fld>
             <a:endParaRPr lang="da-DK"/>
           </a:p>
@@ -2465,7 +2465,7 @@
           <a:p>
             <a:fld id="{E4F54686-28C7-41F7-9FF9-CCD97C84AAF1}" type="datetimeFigureOut">
               <a:rPr lang="da-DK" smtClean="0"/>
-              <a:t>15-01-2023</a:t>
+              <a:t>16-01-2023</a:t>
             </a:fld>
             <a:endParaRPr lang="da-DK"/>
           </a:p>
@@ -2635,7 +2635,7 @@
           <a:p>
             <a:fld id="{E4F54686-28C7-41F7-9FF9-CCD97C84AAF1}" type="datetimeFigureOut">
               <a:rPr lang="da-DK" smtClean="0"/>
-              <a:t>15-01-2023</a:t>
+              <a:t>16-01-2023</a:t>
             </a:fld>
             <a:endParaRPr lang="da-DK"/>
           </a:p>
@@ -2815,7 +2815,7 @@
           <a:p>
             <a:fld id="{E4F54686-28C7-41F7-9FF9-CCD97C84AAF1}" type="datetimeFigureOut">
               <a:rPr lang="da-DK" smtClean="0"/>
-              <a:t>15-01-2023</a:t>
+              <a:t>16-01-2023</a:t>
             </a:fld>
             <a:endParaRPr lang="da-DK"/>
           </a:p>
@@ -2991,7 +2991,7 @@
           <a:p>
             <a:fld id="{E4F54686-28C7-41F7-9FF9-CCD97C84AAF1}" type="datetimeFigureOut">
               <a:rPr lang="da-DK" smtClean="0"/>
-              <a:t>15-01-2023</a:t>
+              <a:t>16-01-2023</a:t>
             </a:fld>
             <a:endParaRPr lang="da-DK"/>
           </a:p>
@@ -3238,7 +3238,7 @@
           <a:p>
             <a:fld id="{E4F54686-28C7-41F7-9FF9-CCD97C84AAF1}" type="datetimeFigureOut">
               <a:rPr lang="da-DK" smtClean="0"/>
-              <a:t>15-01-2023</a:t>
+              <a:t>16-01-2023</a:t>
             </a:fld>
             <a:endParaRPr lang="da-DK"/>
           </a:p>
@@ -3470,7 +3470,7 @@
           <a:p>
             <a:fld id="{E4F54686-28C7-41F7-9FF9-CCD97C84AAF1}" type="datetimeFigureOut">
               <a:rPr lang="da-DK" smtClean="0"/>
-              <a:t>15-01-2023</a:t>
+              <a:t>16-01-2023</a:t>
             </a:fld>
             <a:endParaRPr lang="da-DK"/>
           </a:p>
@@ -3844,7 +3844,7 @@
           <a:p>
             <a:fld id="{E4F54686-28C7-41F7-9FF9-CCD97C84AAF1}" type="datetimeFigureOut">
               <a:rPr lang="da-DK" smtClean="0"/>
-              <a:t>15-01-2023</a:t>
+              <a:t>16-01-2023</a:t>
             </a:fld>
             <a:endParaRPr lang="da-DK"/>
           </a:p>
@@ -3967,7 +3967,7 @@
           <a:p>
             <a:fld id="{E4F54686-28C7-41F7-9FF9-CCD97C84AAF1}" type="datetimeFigureOut">
               <a:rPr lang="da-DK" smtClean="0"/>
-              <a:t>15-01-2023</a:t>
+              <a:t>16-01-2023</a:t>
             </a:fld>
             <a:endParaRPr lang="da-DK"/>
           </a:p>
@@ -4062,7 +4062,7 @@
           <a:p>
             <a:fld id="{E4F54686-28C7-41F7-9FF9-CCD97C84AAF1}" type="datetimeFigureOut">
               <a:rPr lang="da-DK" smtClean="0"/>
-              <a:t>15-01-2023</a:t>
+              <a:t>16-01-2023</a:t>
             </a:fld>
             <a:endParaRPr lang="da-DK"/>
           </a:p>
@@ -4317,7 +4317,7 @@
           <a:p>
             <a:fld id="{E4F54686-28C7-41F7-9FF9-CCD97C84AAF1}" type="datetimeFigureOut">
               <a:rPr lang="da-DK" smtClean="0"/>
-              <a:t>15-01-2023</a:t>
+              <a:t>16-01-2023</a:t>
             </a:fld>
             <a:endParaRPr lang="da-DK"/>
           </a:p>
@@ -4580,7 +4580,7 @@
           <a:p>
             <a:fld id="{E4F54686-28C7-41F7-9FF9-CCD97C84AAF1}" type="datetimeFigureOut">
               <a:rPr lang="da-DK" smtClean="0"/>
-              <a:t>15-01-2023</a:t>
+              <a:t>16-01-2023</a:t>
             </a:fld>
             <a:endParaRPr lang="da-DK"/>
           </a:p>
@@ -5323,7 +5323,7 @@
           <a:p>
             <a:fld id="{E4F54686-28C7-41F7-9FF9-CCD97C84AAF1}" type="datetimeFigureOut">
               <a:rPr lang="da-DK" smtClean="0"/>
-              <a:t>15-01-2023</a:t>
+              <a:t>16-01-2023</a:t>
             </a:fld>
             <a:endParaRPr lang="da-DK"/>
           </a:p>
@@ -5863,8 +5863,8 @@
         </p:nvSpPr>
         <p:spPr>
           <a:xfrm>
-            <a:off x="3264353" y="2772507"/>
-            <a:ext cx="5663294" cy="1312985"/>
+            <a:off x="994299" y="2772507"/>
+            <a:ext cx="8868792" cy="1312985"/>
           </a:xfrm>
           <a:prstGeom prst="rect">
             <a:avLst/>
@@ -5950,7 +5950,15 @@
             <a:pPr algn="ctr"/>
             <a:r>
               <a:rPr lang="en-US" dirty="0"/>
-              <a:t>LogSearcher</a:t>
+              <a:t>Udvikling </a:t>
+            </a:r>
+            <a:r>
+              <a:rPr lang="en-US" dirty="0" err="1"/>
+              <a:t>af</a:t>
+            </a:r>
+            <a:r>
+              <a:rPr lang="en-US" dirty="0"/>
+              <a:t> LogSearcher</a:t>
             </a:r>
             <a:endParaRPr lang="da-DK" dirty="0"/>
           </a:p>
@@ -16784,548 +16792,6 @@
       </p:grpSpPr>
       <p:sp>
         <p:nvSpPr>
-          <p:cNvPr id="4" name="TextBox 3">
-            <a:extLst>
-              <a:ext uri="{FF2B5EF4-FFF2-40B4-BE49-F238E27FC236}">
-                <a16:creationId xmlns:a16="http://schemas.microsoft.com/office/drawing/2014/main" id="{1489911D-BDFD-6A0D-CD51-74E9082B07D0}"/>
-              </a:ext>
-            </a:extLst>
-          </p:cNvPr>
-          <p:cNvSpPr txBox="1"/>
-          <p:nvPr/>
-        </p:nvSpPr>
-        <p:spPr>
-          <a:xfrm>
-            <a:off x="905162" y="631454"/>
-            <a:ext cx="7033491" cy="3416320"/>
-          </a:xfrm>
-          <a:prstGeom prst="rect">
-            <a:avLst/>
-          </a:prstGeom>
-          <a:noFill/>
-          <a:ln>
-            <a:solidFill>
-              <a:schemeClr val="accent5"/>
-            </a:solidFill>
-            <a:prstDash val="dash"/>
-          </a:ln>
-        </p:spPr>
-        <p:txBody>
-          <a:bodyPr wrap="square" rtlCol="0">
-            <a:spAutoFit/>
-          </a:bodyPr>
-          <a:lstStyle/>
-          <a:p>
-            <a:r>
-              <a:rPr lang="en-US" dirty="0"/>
-              <a:t>(</a:t>
-            </a:r>
-            <a:r>
-              <a:rPr lang="en-US" dirty="0" err="1"/>
-              <a:t>kør</a:t>
-            </a:r>
-            <a:r>
-              <a:rPr lang="en-US" dirty="0"/>
-              <a:t> script 1resetG3.cmd)</a:t>
-            </a:r>
-          </a:p>
-          <a:p>
-            <a:r>
-              <a:rPr lang="en-US" dirty="0"/>
-              <a:t>Load 2 </a:t>
-            </a:r>
-            <a:r>
-              <a:rPr lang="en-US" dirty="0" err="1"/>
-              <a:t>sæt</a:t>
-            </a:r>
-            <a:r>
-              <a:rPr lang="en-US" dirty="0"/>
-              <a:t> filer (G1+2)</a:t>
-            </a:r>
-            <a:br>
-              <a:rPr lang="en-US" dirty="0"/>
-            </a:br>
-            <a:r>
-              <a:rPr lang="en-US" dirty="0" err="1"/>
-              <a:t>vælg</a:t>
-            </a:r>
-            <a:r>
-              <a:rPr lang="en-US" dirty="0"/>
-              <a:t> G1-2, </a:t>
-            </a:r>
-            <a:r>
-              <a:rPr lang="en-US" dirty="0" err="1"/>
-              <a:t>søg</a:t>
-            </a:r>
-            <a:r>
-              <a:rPr lang="en-US" dirty="0"/>
-              <a:t> </a:t>
-            </a:r>
-            <a:r>
-              <a:rPr lang="en-US" dirty="0" err="1"/>
-              <a:t>uden</a:t>
-            </a:r>
-            <a:r>
-              <a:rPr lang="en-US" dirty="0"/>
-              <a:t> keyword, med default </a:t>
-            </a:r>
-            <a:r>
-              <a:rPr lang="en-US" dirty="0" err="1"/>
-              <a:t>tids</a:t>
-            </a:r>
-            <a:r>
-              <a:rPr lang="en-US" dirty="0"/>
-              <a:t>-interval</a:t>
-            </a:r>
-          </a:p>
-          <a:p>
-            <a:endParaRPr lang="en-US" dirty="0"/>
-          </a:p>
-          <a:p>
-            <a:r>
-              <a:rPr lang="en-US" dirty="0"/>
-              <a:t>Load G3	</a:t>
-            </a:r>
-          </a:p>
-          <a:p>
-            <a:r>
-              <a:rPr lang="en-US" dirty="0" err="1"/>
-              <a:t>Vælg</a:t>
-            </a:r>
-            <a:r>
-              <a:rPr lang="en-US" dirty="0"/>
-              <a:t> G1-3, </a:t>
-            </a:r>
-            <a:r>
-              <a:rPr lang="en-US" dirty="0" err="1"/>
-              <a:t>søg</a:t>
-            </a:r>
-            <a:r>
-              <a:rPr lang="en-US" dirty="0"/>
-              <a:t> </a:t>
-            </a:r>
-            <a:r>
-              <a:rPr lang="en-US" dirty="0" err="1"/>
-              <a:t>uden</a:t>
-            </a:r>
-            <a:r>
-              <a:rPr lang="en-US" dirty="0"/>
-              <a:t> keyword</a:t>
-            </a:r>
-          </a:p>
-          <a:p>
-            <a:r>
-              <a:rPr lang="en-US" dirty="0"/>
-              <a:t>	</a:t>
-            </a:r>
-            <a:r>
-              <a:rPr lang="en-US" dirty="0" err="1"/>
-              <a:t>skift</a:t>
-            </a:r>
-            <a:r>
-              <a:rPr lang="en-US" dirty="0"/>
-              <a:t> </a:t>
-            </a:r>
-            <a:r>
-              <a:rPr lang="en-US" dirty="0" err="1"/>
-              <a:t>tidsinterval</a:t>
-            </a:r>
-            <a:r>
-              <a:rPr lang="en-US" dirty="0"/>
-              <a:t> slut@1.jan21, </a:t>
-            </a:r>
-            <a:r>
-              <a:rPr lang="en-US" dirty="0" err="1"/>
-              <a:t>gentag</a:t>
-            </a:r>
-            <a:r>
-              <a:rPr lang="en-US" dirty="0"/>
-              <a:t> </a:t>
-            </a:r>
-            <a:r>
-              <a:rPr lang="en-US" dirty="0" err="1"/>
-              <a:t>søgning</a:t>
-            </a:r>
-            <a:r>
-              <a:rPr lang="en-US" dirty="0"/>
-              <a:t> </a:t>
-            </a:r>
-            <a:r>
-              <a:rPr lang="en-US" dirty="0" err="1"/>
-              <a:t>uden</a:t>
-            </a:r>
-            <a:r>
-              <a:rPr lang="en-US" dirty="0"/>
-              <a:t> keyword</a:t>
-            </a:r>
-            <a:br>
-              <a:rPr lang="en-US" dirty="0"/>
-            </a:br>
-            <a:br>
-              <a:rPr lang="en-US" dirty="0"/>
-            </a:br>
-            <a:r>
-              <a:rPr lang="en-US" dirty="0" err="1"/>
-              <a:t>vælg</a:t>
-            </a:r>
-            <a:r>
-              <a:rPr lang="en-US" dirty="0"/>
-              <a:t> G1, 	</a:t>
-            </a:r>
-            <a:r>
-              <a:rPr lang="en-US" dirty="0" err="1"/>
-              <a:t>søg</a:t>
-            </a:r>
-            <a:r>
-              <a:rPr lang="en-US" dirty="0"/>
-              <a:t> </a:t>
-            </a:r>
-            <a:r>
-              <a:rPr lang="en-US" dirty="0" err="1"/>
-              <a:t>på</a:t>
-            </a:r>
-            <a:r>
-              <a:rPr lang="en-US" dirty="0"/>
-              <a:t> “error”</a:t>
-            </a:r>
-          </a:p>
-          <a:p>
-            <a:r>
-              <a:rPr lang="en-US" dirty="0"/>
-              <a:t>	</a:t>
-            </a:r>
-            <a:r>
-              <a:rPr lang="en-US" dirty="0" err="1"/>
-              <a:t>søg</a:t>
-            </a:r>
-            <a:r>
-              <a:rPr lang="en-US" dirty="0"/>
-              <a:t> </a:t>
-            </a:r>
-            <a:r>
-              <a:rPr lang="en-US" dirty="0" err="1"/>
-              <a:t>på</a:t>
-            </a:r>
-            <a:r>
-              <a:rPr lang="en-US" dirty="0"/>
-              <a:t> “error config” (/research)	</a:t>
-            </a:r>
-          </a:p>
-          <a:p>
-            <a:endParaRPr lang="en-US" dirty="0"/>
-          </a:p>
-          <a:p>
-            <a:r>
-              <a:rPr lang="en-US" dirty="0" err="1"/>
-              <a:t>Vælg</a:t>
-            </a:r>
-            <a:r>
-              <a:rPr lang="en-US" dirty="0"/>
-              <a:t> G1-3, </a:t>
-            </a:r>
-            <a:r>
-              <a:rPr lang="en-US" dirty="0" err="1"/>
-              <a:t>søg</a:t>
-            </a:r>
-            <a:r>
-              <a:rPr lang="en-US" dirty="0"/>
-              <a:t> </a:t>
-            </a:r>
-            <a:r>
-              <a:rPr lang="en-US" dirty="0" err="1"/>
-              <a:t>på</a:t>
-            </a:r>
-            <a:r>
-              <a:rPr lang="en-US" dirty="0"/>
-              <a:t> “error config” -&gt; vis 2 sys </a:t>
-            </a:r>
-            <a:r>
-              <a:rPr lang="en-US" dirty="0" err="1"/>
-              <a:t>i</a:t>
-            </a:r>
-            <a:r>
-              <a:rPr lang="en-US" dirty="0"/>
-              <a:t> </a:t>
-            </a:r>
-            <a:r>
-              <a:rPr lang="en-US" dirty="0" err="1"/>
-              <a:t>søgeresultat</a:t>
-            </a:r>
-            <a:endParaRPr lang="en-US" dirty="0"/>
-          </a:p>
-        </p:txBody>
-      </p:sp>
-      <p:sp>
-        <p:nvSpPr>
-          <p:cNvPr id="2" name="TextBox 1">
-            <a:extLst>
-              <a:ext uri="{FF2B5EF4-FFF2-40B4-BE49-F238E27FC236}">
-                <a16:creationId xmlns:a16="http://schemas.microsoft.com/office/drawing/2014/main" id="{9D019424-C2C3-3DF7-68E6-2473D60F0DE1}"/>
-              </a:ext>
-            </a:extLst>
-          </p:cNvPr>
-          <p:cNvSpPr txBox="1"/>
-          <p:nvPr/>
-        </p:nvSpPr>
-        <p:spPr>
-          <a:xfrm>
-            <a:off x="8340438" y="215956"/>
-            <a:ext cx="2946400" cy="830997"/>
-          </a:xfrm>
-          <a:prstGeom prst="rect">
-            <a:avLst/>
-          </a:prstGeom>
-          <a:noFill/>
-        </p:spPr>
-        <p:txBody>
-          <a:bodyPr wrap="square" rtlCol="0">
-            <a:spAutoFit/>
-          </a:bodyPr>
-          <a:lstStyle/>
-          <a:p>
-            <a:r>
-              <a:rPr lang="en-US" sz="2400" dirty="0"/>
-              <a:t>LogWatcher demo</a:t>
-            </a:r>
-          </a:p>
-          <a:p>
-            <a:endParaRPr lang="da-DK" sz="2400" dirty="0"/>
-          </a:p>
-        </p:txBody>
-      </p:sp>
-      <p:sp>
-        <p:nvSpPr>
-          <p:cNvPr id="3" name="TextBox 2">
-            <a:extLst>
-              <a:ext uri="{FF2B5EF4-FFF2-40B4-BE49-F238E27FC236}">
-                <a16:creationId xmlns:a16="http://schemas.microsoft.com/office/drawing/2014/main" id="{8CA02E7E-5E75-5ECA-4A67-1EF1AE9CDBAD}"/>
-              </a:ext>
-            </a:extLst>
-          </p:cNvPr>
-          <p:cNvSpPr txBox="1"/>
-          <p:nvPr/>
-        </p:nvSpPr>
-        <p:spPr>
-          <a:xfrm>
-            <a:off x="5237378" y="3641223"/>
-            <a:ext cx="5218544" cy="2585323"/>
-          </a:xfrm>
-          <a:prstGeom prst="rect">
-            <a:avLst/>
-          </a:prstGeom>
-          <a:noFill/>
-          <a:ln>
-            <a:solidFill>
-              <a:schemeClr val="accent5"/>
-            </a:solidFill>
-            <a:prstDash val="dash"/>
-          </a:ln>
-        </p:spPr>
-        <p:txBody>
-          <a:bodyPr wrap="square" rtlCol="0">
-            <a:spAutoFit/>
-          </a:bodyPr>
-          <a:lstStyle/>
-          <a:p>
-            <a:br>
-              <a:rPr lang="en-US" dirty="0"/>
-            </a:br>
-            <a:endParaRPr lang="en-US" dirty="0"/>
-          </a:p>
-          <a:p>
-            <a:r>
-              <a:rPr lang="en-US" dirty="0"/>
-              <a:t>(</a:t>
-            </a:r>
-            <a:r>
-              <a:rPr lang="en-US" dirty="0" err="1"/>
-              <a:t>kør</a:t>
-            </a:r>
-            <a:r>
-              <a:rPr lang="en-US" dirty="0"/>
-              <a:t> script 2updateG3.cmd) -&gt; </a:t>
-            </a:r>
-            <a:r>
-              <a:rPr lang="en-US" dirty="0" err="1"/>
-              <a:t>opdater</a:t>
-            </a:r>
-            <a:r>
-              <a:rPr lang="en-US" dirty="0"/>
-              <a:t> G3</a:t>
-            </a:r>
-          </a:p>
-          <a:p>
-            <a:br>
-              <a:rPr lang="en-US" dirty="0"/>
-            </a:br>
-            <a:r>
-              <a:rPr lang="en-US" dirty="0" err="1"/>
-              <a:t>Vælg</a:t>
-            </a:r>
-            <a:r>
-              <a:rPr lang="en-US" dirty="0"/>
-              <a:t> G1-3, </a:t>
-            </a:r>
-            <a:r>
-              <a:rPr lang="en-US" dirty="0" err="1"/>
-              <a:t>sæt</a:t>
-            </a:r>
-            <a:r>
-              <a:rPr lang="en-US" dirty="0"/>
-              <a:t> </a:t>
-            </a:r>
-            <a:r>
-              <a:rPr lang="en-US" dirty="0" err="1"/>
-              <a:t>tidsinterval</a:t>
-            </a:r>
-            <a:r>
-              <a:rPr lang="en-US" dirty="0"/>
-              <a:t> start@18. sept	</a:t>
-            </a:r>
-          </a:p>
-          <a:p>
-            <a:r>
-              <a:rPr lang="en-US" dirty="0"/>
-              <a:t>	</a:t>
-            </a:r>
-            <a:r>
-              <a:rPr lang="en-US" dirty="0" err="1"/>
-              <a:t>søg</a:t>
-            </a:r>
-            <a:r>
-              <a:rPr lang="en-US" dirty="0"/>
-              <a:t> </a:t>
-            </a:r>
-            <a:r>
-              <a:rPr lang="en-US" dirty="0" err="1"/>
-              <a:t>på</a:t>
-            </a:r>
-            <a:r>
-              <a:rPr lang="en-US" dirty="0"/>
-              <a:t> “</a:t>
-            </a:r>
-            <a:r>
-              <a:rPr lang="en-US" dirty="0" err="1"/>
-              <a:t>daletservice</a:t>
-            </a:r>
-            <a:r>
-              <a:rPr lang="en-US" dirty="0"/>
-              <a:t> find”</a:t>
-            </a:r>
-          </a:p>
-          <a:p>
-            <a:r>
-              <a:rPr lang="en-US" dirty="0"/>
-              <a:t>	</a:t>
-            </a:r>
-            <a:r>
-              <a:rPr lang="en-US" dirty="0" err="1"/>
-              <a:t>sæt</a:t>
-            </a:r>
-            <a:r>
-              <a:rPr lang="en-US" dirty="0"/>
-              <a:t> </a:t>
-            </a:r>
-            <a:r>
-              <a:rPr lang="en-US" dirty="0" err="1"/>
-              <a:t>tidsinterval</a:t>
-            </a:r>
-            <a:r>
-              <a:rPr lang="en-US" dirty="0"/>
-              <a:t> slut@19. sept 2020</a:t>
-            </a:r>
-          </a:p>
-          <a:p>
-            <a:r>
-              <a:rPr lang="en-US" dirty="0"/>
-              <a:t>	</a:t>
-            </a:r>
-            <a:r>
-              <a:rPr lang="en-US" dirty="0" err="1"/>
-              <a:t>søg</a:t>
-            </a:r>
-            <a:r>
-              <a:rPr lang="en-US" dirty="0"/>
-              <a:t> </a:t>
-            </a:r>
-            <a:r>
-              <a:rPr lang="en-US" dirty="0" err="1"/>
-              <a:t>på</a:t>
-            </a:r>
-            <a:r>
-              <a:rPr lang="en-US" dirty="0"/>
-              <a:t> “</a:t>
-            </a:r>
-            <a:r>
-              <a:rPr lang="en-US" dirty="0" err="1"/>
-              <a:t>daletservice</a:t>
-            </a:r>
-            <a:r>
-              <a:rPr lang="en-US" dirty="0"/>
-              <a:t> find”</a:t>
-            </a:r>
-          </a:p>
-          <a:p>
-            <a:r>
-              <a:rPr lang="en-US" dirty="0"/>
-              <a:t>	</a:t>
-            </a:r>
-            <a:r>
-              <a:rPr lang="en-US" dirty="0" err="1"/>
-              <a:t>åbn</a:t>
-            </a:r>
-            <a:r>
-              <a:rPr lang="en-US" dirty="0"/>
-              <a:t> </a:t>
-            </a:r>
-            <a:r>
-              <a:rPr lang="en-US" dirty="0" err="1"/>
-              <a:t>fundet</a:t>
-            </a:r>
-            <a:r>
-              <a:rPr lang="en-US" dirty="0"/>
-              <a:t> </a:t>
-            </a:r>
-            <a:r>
-              <a:rPr lang="en-US" dirty="0" err="1"/>
-              <a:t>logfil</a:t>
-            </a:r>
-            <a:endParaRPr lang="da-DK" dirty="0"/>
-          </a:p>
-        </p:txBody>
-      </p:sp>
-    </p:spTree>
-    <p:extLst>
-      <p:ext uri="{BB962C8B-B14F-4D97-AF65-F5344CB8AC3E}">
-        <p14:creationId xmlns:p14="http://schemas.microsoft.com/office/powerpoint/2010/main" val="2475599905"/>
-      </p:ext>
-    </p:extLst>
-  </p:cSld>
-  <p:clrMapOvr>
-    <a:masterClrMapping/>
-  </p:clrMapOvr>
-</p:sld>
-</file>
-
-<file path=ppt/slides/slide5.xml><?xml version="1.0" encoding="utf-8"?>
-<p:sld xmlns:a="http://schemas.openxmlformats.org/drawingml/2006/main" xmlns:r="http://schemas.openxmlformats.org/officeDocument/2006/relationships" xmlns:p="http://schemas.openxmlformats.org/presentationml/2006/main">
-  <p:cSld>
-    <p:spTree>
-      <p:nvGrpSpPr>
-        <p:cNvPr id="1" name=""/>
-        <p:cNvGrpSpPr/>
-        <p:nvPr/>
-      </p:nvGrpSpPr>
-      <p:grpSpPr>
-        <a:xfrm>
-          <a:off x="0" y="0"/>
-          <a:ext cx="0" cy="0"/>
-          <a:chOff x="0" y="0"/>
-          <a:chExt cx="0" cy="0"/>
-        </a:xfrm>
-      </p:grpSpPr>
-      <p:sp>
-        <p:nvSpPr>
           <p:cNvPr id="2" name="Title 1">
             <a:extLst>
               <a:ext uri="{FF2B5EF4-FFF2-40B4-BE49-F238E27FC236}">
@@ -17490,39 +16956,6 @@
                     <a:cs typeface="Times New Roman" panose="02020603050405020304" pitchFamily="18" charset="0"/>
                   </a:rPr>
                 </a:br>
-                <a:r>
-                  <a:rPr lang="da-DK" sz="1100" dirty="0">
-                    <a:solidFill>
-                      <a:srgbClr val="000000"/>
-                    </a:solidFill>
-                    <a:effectLst/>
-                    <a:ea typeface="Calibri Light" panose="020F0302020204030204" pitchFamily="34" charset="0"/>
-                    <a:cs typeface="Times New Roman" panose="02020603050405020304" pitchFamily="18" charset="0"/>
-                  </a:rPr>
-                  <a:t>(C# </a:t>
-                </a:r>
-                <a:r>
-                  <a:rPr lang="da-DK" sz="1100" dirty="0" err="1">
-                    <a:solidFill>
-                      <a:srgbClr val="000000"/>
-                    </a:solidFill>
-                    <a:effectLst/>
-                    <a:ea typeface="Calibri Light" panose="020F0302020204030204" pitchFamily="34" charset="0"/>
-                    <a:cs typeface="Times New Roman" panose="02020603050405020304" pitchFamily="18" charset="0"/>
-                  </a:rPr>
-                  <a:t>Blazor</a:t>
-                </a:r>
-                <a:r>
-                  <a:rPr lang="da-DK" sz="1100" dirty="0">
-                    <a:solidFill>
-                      <a:srgbClr val="000000"/>
-                    </a:solidFill>
-                    <a:effectLst/>
-                    <a:ea typeface="Calibri Light" panose="020F0302020204030204" pitchFamily="34" charset="0"/>
-                    <a:cs typeface="Times New Roman" panose="02020603050405020304" pitchFamily="18" charset="0"/>
-                  </a:rPr>
-                  <a:t>)</a:t>
-                </a:r>
                 <a:endParaRPr lang="da-DK" sz="1100" dirty="0">
                   <a:effectLst/>
                   <a:ea typeface="Calibri Light" panose="020F0302020204030204" pitchFamily="34" charset="0"/>
@@ -18180,6 +17613,548 @@
 </p:sld>
 </file>
 
+<file path=ppt/slides/slide5.xml><?xml version="1.0" encoding="utf-8"?>
+<p:sld xmlns:a="http://schemas.openxmlformats.org/drawingml/2006/main" xmlns:r="http://schemas.openxmlformats.org/officeDocument/2006/relationships" xmlns:p="http://schemas.openxmlformats.org/presentationml/2006/main">
+  <p:cSld>
+    <p:spTree>
+      <p:nvGrpSpPr>
+        <p:cNvPr id="1" name=""/>
+        <p:cNvGrpSpPr/>
+        <p:nvPr/>
+      </p:nvGrpSpPr>
+      <p:grpSpPr>
+        <a:xfrm>
+          <a:off x="0" y="0"/>
+          <a:ext cx="0" cy="0"/>
+          <a:chOff x="0" y="0"/>
+          <a:chExt cx="0" cy="0"/>
+        </a:xfrm>
+      </p:grpSpPr>
+      <p:sp>
+        <p:nvSpPr>
+          <p:cNvPr id="4" name="TextBox 3">
+            <a:extLst>
+              <a:ext uri="{FF2B5EF4-FFF2-40B4-BE49-F238E27FC236}">
+                <a16:creationId xmlns:a16="http://schemas.microsoft.com/office/drawing/2014/main" id="{1489911D-BDFD-6A0D-CD51-74E9082B07D0}"/>
+              </a:ext>
+            </a:extLst>
+          </p:cNvPr>
+          <p:cNvSpPr txBox="1"/>
+          <p:nvPr/>
+        </p:nvSpPr>
+        <p:spPr>
+          <a:xfrm>
+            <a:off x="905162" y="631454"/>
+            <a:ext cx="7033491" cy="3416320"/>
+          </a:xfrm>
+          <a:prstGeom prst="rect">
+            <a:avLst/>
+          </a:prstGeom>
+          <a:noFill/>
+          <a:ln>
+            <a:solidFill>
+              <a:schemeClr val="accent5"/>
+            </a:solidFill>
+            <a:prstDash val="dash"/>
+          </a:ln>
+        </p:spPr>
+        <p:txBody>
+          <a:bodyPr wrap="square" rtlCol="0">
+            <a:spAutoFit/>
+          </a:bodyPr>
+          <a:lstStyle/>
+          <a:p>
+            <a:r>
+              <a:rPr lang="en-US" dirty="0"/>
+              <a:t>(</a:t>
+            </a:r>
+            <a:r>
+              <a:rPr lang="en-US" dirty="0" err="1"/>
+              <a:t>kør</a:t>
+            </a:r>
+            <a:r>
+              <a:rPr lang="en-US" dirty="0"/>
+              <a:t> script 1resetG3.cmd)</a:t>
+            </a:r>
+          </a:p>
+          <a:p>
+            <a:r>
+              <a:rPr lang="en-US" dirty="0"/>
+              <a:t>Load 2 </a:t>
+            </a:r>
+            <a:r>
+              <a:rPr lang="en-US" dirty="0" err="1"/>
+              <a:t>sæt</a:t>
+            </a:r>
+            <a:r>
+              <a:rPr lang="en-US" dirty="0"/>
+              <a:t> filer (G1+2)</a:t>
+            </a:r>
+            <a:br>
+              <a:rPr lang="en-US" dirty="0"/>
+            </a:br>
+            <a:r>
+              <a:rPr lang="en-US" dirty="0" err="1"/>
+              <a:t>vælg</a:t>
+            </a:r>
+            <a:r>
+              <a:rPr lang="en-US" dirty="0"/>
+              <a:t> G1-2, </a:t>
+            </a:r>
+            <a:r>
+              <a:rPr lang="en-US" dirty="0" err="1"/>
+              <a:t>søg</a:t>
+            </a:r>
+            <a:r>
+              <a:rPr lang="en-US" dirty="0"/>
+              <a:t> </a:t>
+            </a:r>
+            <a:r>
+              <a:rPr lang="en-US" dirty="0" err="1"/>
+              <a:t>uden</a:t>
+            </a:r>
+            <a:r>
+              <a:rPr lang="en-US" dirty="0"/>
+              <a:t> keyword, med default </a:t>
+            </a:r>
+            <a:r>
+              <a:rPr lang="en-US" dirty="0" err="1"/>
+              <a:t>tids</a:t>
+            </a:r>
+            <a:r>
+              <a:rPr lang="en-US" dirty="0"/>
+              <a:t>-interval</a:t>
+            </a:r>
+          </a:p>
+          <a:p>
+            <a:endParaRPr lang="en-US" dirty="0"/>
+          </a:p>
+          <a:p>
+            <a:r>
+              <a:rPr lang="en-US" dirty="0"/>
+              <a:t>Load G3	</a:t>
+            </a:r>
+          </a:p>
+          <a:p>
+            <a:r>
+              <a:rPr lang="en-US" dirty="0" err="1"/>
+              <a:t>Vælg</a:t>
+            </a:r>
+            <a:r>
+              <a:rPr lang="en-US" dirty="0"/>
+              <a:t> G1-3, </a:t>
+            </a:r>
+            <a:r>
+              <a:rPr lang="en-US" dirty="0" err="1"/>
+              <a:t>søg</a:t>
+            </a:r>
+            <a:r>
+              <a:rPr lang="en-US" dirty="0"/>
+              <a:t> </a:t>
+            </a:r>
+            <a:r>
+              <a:rPr lang="en-US" dirty="0" err="1"/>
+              <a:t>uden</a:t>
+            </a:r>
+            <a:r>
+              <a:rPr lang="en-US" dirty="0"/>
+              <a:t> keyword</a:t>
+            </a:r>
+          </a:p>
+          <a:p>
+            <a:r>
+              <a:rPr lang="en-US" dirty="0"/>
+              <a:t>	</a:t>
+            </a:r>
+            <a:r>
+              <a:rPr lang="en-US" dirty="0" err="1"/>
+              <a:t>skift</a:t>
+            </a:r>
+            <a:r>
+              <a:rPr lang="en-US" dirty="0"/>
+              <a:t> </a:t>
+            </a:r>
+            <a:r>
+              <a:rPr lang="en-US" dirty="0" err="1"/>
+              <a:t>tidsinterval</a:t>
+            </a:r>
+            <a:r>
+              <a:rPr lang="en-US" dirty="0"/>
+              <a:t> slut@1.jan21, </a:t>
+            </a:r>
+            <a:r>
+              <a:rPr lang="en-US" dirty="0" err="1"/>
+              <a:t>gentag</a:t>
+            </a:r>
+            <a:r>
+              <a:rPr lang="en-US" dirty="0"/>
+              <a:t> </a:t>
+            </a:r>
+            <a:r>
+              <a:rPr lang="en-US" dirty="0" err="1"/>
+              <a:t>søgning</a:t>
+            </a:r>
+            <a:r>
+              <a:rPr lang="en-US" dirty="0"/>
+              <a:t> </a:t>
+            </a:r>
+            <a:r>
+              <a:rPr lang="en-US" dirty="0" err="1"/>
+              <a:t>uden</a:t>
+            </a:r>
+            <a:r>
+              <a:rPr lang="en-US" dirty="0"/>
+              <a:t> keyword</a:t>
+            </a:r>
+            <a:br>
+              <a:rPr lang="en-US" dirty="0"/>
+            </a:br>
+            <a:br>
+              <a:rPr lang="en-US" dirty="0"/>
+            </a:br>
+            <a:r>
+              <a:rPr lang="en-US" dirty="0" err="1"/>
+              <a:t>vælg</a:t>
+            </a:r>
+            <a:r>
+              <a:rPr lang="en-US" dirty="0"/>
+              <a:t> G1, 	</a:t>
+            </a:r>
+            <a:r>
+              <a:rPr lang="en-US" dirty="0" err="1"/>
+              <a:t>søg</a:t>
+            </a:r>
+            <a:r>
+              <a:rPr lang="en-US" dirty="0"/>
+              <a:t> </a:t>
+            </a:r>
+            <a:r>
+              <a:rPr lang="en-US" dirty="0" err="1"/>
+              <a:t>på</a:t>
+            </a:r>
+            <a:r>
+              <a:rPr lang="en-US" dirty="0"/>
+              <a:t> “error”</a:t>
+            </a:r>
+          </a:p>
+          <a:p>
+            <a:r>
+              <a:rPr lang="en-US" dirty="0"/>
+              <a:t>	</a:t>
+            </a:r>
+            <a:r>
+              <a:rPr lang="en-US" dirty="0" err="1"/>
+              <a:t>søg</a:t>
+            </a:r>
+            <a:r>
+              <a:rPr lang="en-US" dirty="0"/>
+              <a:t> </a:t>
+            </a:r>
+            <a:r>
+              <a:rPr lang="en-US" dirty="0" err="1"/>
+              <a:t>på</a:t>
+            </a:r>
+            <a:r>
+              <a:rPr lang="en-US" dirty="0"/>
+              <a:t> “error config” (/research)	</a:t>
+            </a:r>
+          </a:p>
+          <a:p>
+            <a:endParaRPr lang="en-US" dirty="0"/>
+          </a:p>
+          <a:p>
+            <a:r>
+              <a:rPr lang="en-US" dirty="0" err="1"/>
+              <a:t>Vælg</a:t>
+            </a:r>
+            <a:r>
+              <a:rPr lang="en-US" dirty="0"/>
+              <a:t> G1-3, </a:t>
+            </a:r>
+            <a:r>
+              <a:rPr lang="en-US" dirty="0" err="1"/>
+              <a:t>søg</a:t>
+            </a:r>
+            <a:r>
+              <a:rPr lang="en-US" dirty="0"/>
+              <a:t> </a:t>
+            </a:r>
+            <a:r>
+              <a:rPr lang="en-US" dirty="0" err="1"/>
+              <a:t>på</a:t>
+            </a:r>
+            <a:r>
+              <a:rPr lang="en-US" dirty="0"/>
+              <a:t> “error config” -&gt; vis 2 sys </a:t>
+            </a:r>
+            <a:r>
+              <a:rPr lang="en-US" dirty="0" err="1"/>
+              <a:t>i</a:t>
+            </a:r>
+            <a:r>
+              <a:rPr lang="en-US" dirty="0"/>
+              <a:t> </a:t>
+            </a:r>
+            <a:r>
+              <a:rPr lang="en-US" dirty="0" err="1"/>
+              <a:t>søgeresultat</a:t>
+            </a:r>
+            <a:endParaRPr lang="en-US" dirty="0"/>
+          </a:p>
+        </p:txBody>
+      </p:sp>
+      <p:sp>
+        <p:nvSpPr>
+          <p:cNvPr id="2" name="TextBox 1">
+            <a:extLst>
+              <a:ext uri="{FF2B5EF4-FFF2-40B4-BE49-F238E27FC236}">
+                <a16:creationId xmlns:a16="http://schemas.microsoft.com/office/drawing/2014/main" id="{9D019424-C2C3-3DF7-68E6-2473D60F0DE1}"/>
+              </a:ext>
+            </a:extLst>
+          </p:cNvPr>
+          <p:cNvSpPr txBox="1"/>
+          <p:nvPr/>
+        </p:nvSpPr>
+        <p:spPr>
+          <a:xfrm>
+            <a:off x="8340438" y="215956"/>
+            <a:ext cx="2946400" cy="830997"/>
+          </a:xfrm>
+          <a:prstGeom prst="rect">
+            <a:avLst/>
+          </a:prstGeom>
+          <a:noFill/>
+        </p:spPr>
+        <p:txBody>
+          <a:bodyPr wrap="square" rtlCol="0">
+            <a:spAutoFit/>
+          </a:bodyPr>
+          <a:lstStyle/>
+          <a:p>
+            <a:r>
+              <a:rPr lang="en-US" sz="2400" dirty="0"/>
+              <a:t>LogWatcher demo</a:t>
+            </a:r>
+          </a:p>
+          <a:p>
+            <a:endParaRPr lang="da-DK" sz="2400" dirty="0"/>
+          </a:p>
+        </p:txBody>
+      </p:sp>
+      <p:sp>
+        <p:nvSpPr>
+          <p:cNvPr id="3" name="TextBox 2">
+            <a:extLst>
+              <a:ext uri="{FF2B5EF4-FFF2-40B4-BE49-F238E27FC236}">
+                <a16:creationId xmlns:a16="http://schemas.microsoft.com/office/drawing/2014/main" id="{8CA02E7E-5E75-5ECA-4A67-1EF1AE9CDBAD}"/>
+              </a:ext>
+            </a:extLst>
+          </p:cNvPr>
+          <p:cNvSpPr txBox="1"/>
+          <p:nvPr/>
+        </p:nvSpPr>
+        <p:spPr>
+          <a:xfrm>
+            <a:off x="5237378" y="3641223"/>
+            <a:ext cx="5218544" cy="2585323"/>
+          </a:xfrm>
+          <a:prstGeom prst="rect">
+            <a:avLst/>
+          </a:prstGeom>
+          <a:noFill/>
+          <a:ln>
+            <a:solidFill>
+              <a:schemeClr val="accent5"/>
+            </a:solidFill>
+            <a:prstDash val="dash"/>
+          </a:ln>
+        </p:spPr>
+        <p:txBody>
+          <a:bodyPr wrap="square" rtlCol="0">
+            <a:spAutoFit/>
+          </a:bodyPr>
+          <a:lstStyle/>
+          <a:p>
+            <a:br>
+              <a:rPr lang="en-US" dirty="0"/>
+            </a:br>
+            <a:endParaRPr lang="en-US" dirty="0"/>
+          </a:p>
+          <a:p>
+            <a:r>
+              <a:rPr lang="en-US" dirty="0"/>
+              <a:t>(</a:t>
+            </a:r>
+            <a:r>
+              <a:rPr lang="en-US" dirty="0" err="1"/>
+              <a:t>kør</a:t>
+            </a:r>
+            <a:r>
+              <a:rPr lang="en-US" dirty="0"/>
+              <a:t> script 2updateG3.cmd) -&gt; </a:t>
+            </a:r>
+            <a:r>
+              <a:rPr lang="en-US" dirty="0" err="1"/>
+              <a:t>opdater</a:t>
+            </a:r>
+            <a:r>
+              <a:rPr lang="en-US" dirty="0"/>
+              <a:t> G3</a:t>
+            </a:r>
+          </a:p>
+          <a:p>
+            <a:br>
+              <a:rPr lang="en-US" dirty="0"/>
+            </a:br>
+            <a:r>
+              <a:rPr lang="en-US" dirty="0" err="1"/>
+              <a:t>Vælg</a:t>
+            </a:r>
+            <a:r>
+              <a:rPr lang="en-US" dirty="0"/>
+              <a:t> G1-3, </a:t>
+            </a:r>
+            <a:r>
+              <a:rPr lang="en-US" dirty="0" err="1"/>
+              <a:t>sæt</a:t>
+            </a:r>
+            <a:r>
+              <a:rPr lang="en-US" dirty="0"/>
+              <a:t> </a:t>
+            </a:r>
+            <a:r>
+              <a:rPr lang="en-US" dirty="0" err="1"/>
+              <a:t>tidsinterval</a:t>
+            </a:r>
+            <a:r>
+              <a:rPr lang="en-US" dirty="0"/>
+              <a:t> start@18. sept	</a:t>
+            </a:r>
+          </a:p>
+          <a:p>
+            <a:r>
+              <a:rPr lang="en-US" dirty="0"/>
+              <a:t>	</a:t>
+            </a:r>
+            <a:r>
+              <a:rPr lang="en-US" dirty="0" err="1"/>
+              <a:t>søg</a:t>
+            </a:r>
+            <a:r>
+              <a:rPr lang="en-US" dirty="0"/>
+              <a:t> </a:t>
+            </a:r>
+            <a:r>
+              <a:rPr lang="en-US" dirty="0" err="1"/>
+              <a:t>på</a:t>
+            </a:r>
+            <a:r>
+              <a:rPr lang="en-US" dirty="0"/>
+              <a:t> “</a:t>
+            </a:r>
+            <a:r>
+              <a:rPr lang="en-US" dirty="0" err="1"/>
+              <a:t>daletservice</a:t>
+            </a:r>
+            <a:r>
+              <a:rPr lang="en-US" dirty="0"/>
+              <a:t> find”</a:t>
+            </a:r>
+          </a:p>
+          <a:p>
+            <a:r>
+              <a:rPr lang="en-US" dirty="0"/>
+              <a:t>	</a:t>
+            </a:r>
+            <a:r>
+              <a:rPr lang="en-US" dirty="0" err="1"/>
+              <a:t>sæt</a:t>
+            </a:r>
+            <a:r>
+              <a:rPr lang="en-US" dirty="0"/>
+              <a:t> </a:t>
+            </a:r>
+            <a:r>
+              <a:rPr lang="en-US" dirty="0" err="1"/>
+              <a:t>tidsinterval</a:t>
+            </a:r>
+            <a:r>
+              <a:rPr lang="en-US" dirty="0"/>
+              <a:t> slut@19. sept 2020</a:t>
+            </a:r>
+          </a:p>
+          <a:p>
+            <a:r>
+              <a:rPr lang="en-US" dirty="0"/>
+              <a:t>	</a:t>
+            </a:r>
+            <a:r>
+              <a:rPr lang="en-US" dirty="0" err="1"/>
+              <a:t>søg</a:t>
+            </a:r>
+            <a:r>
+              <a:rPr lang="en-US" dirty="0"/>
+              <a:t> </a:t>
+            </a:r>
+            <a:r>
+              <a:rPr lang="en-US" dirty="0" err="1"/>
+              <a:t>på</a:t>
+            </a:r>
+            <a:r>
+              <a:rPr lang="en-US" dirty="0"/>
+              <a:t> “</a:t>
+            </a:r>
+            <a:r>
+              <a:rPr lang="en-US" dirty="0" err="1"/>
+              <a:t>daletservice</a:t>
+            </a:r>
+            <a:r>
+              <a:rPr lang="en-US" dirty="0"/>
+              <a:t> find”</a:t>
+            </a:r>
+          </a:p>
+          <a:p>
+            <a:r>
+              <a:rPr lang="en-US" dirty="0"/>
+              <a:t>	</a:t>
+            </a:r>
+            <a:r>
+              <a:rPr lang="en-US" dirty="0" err="1"/>
+              <a:t>åbn</a:t>
+            </a:r>
+            <a:r>
+              <a:rPr lang="en-US" dirty="0"/>
+              <a:t> </a:t>
+            </a:r>
+            <a:r>
+              <a:rPr lang="en-US" dirty="0" err="1"/>
+              <a:t>fundet</a:t>
+            </a:r>
+            <a:r>
+              <a:rPr lang="en-US" dirty="0"/>
+              <a:t> </a:t>
+            </a:r>
+            <a:r>
+              <a:rPr lang="en-US" dirty="0" err="1"/>
+              <a:t>logfil</a:t>
+            </a:r>
+            <a:endParaRPr lang="da-DK" dirty="0"/>
+          </a:p>
+        </p:txBody>
+      </p:sp>
+    </p:spTree>
+    <p:extLst>
+      <p:ext uri="{BB962C8B-B14F-4D97-AF65-F5344CB8AC3E}">
+        <p14:creationId xmlns:p14="http://schemas.microsoft.com/office/powerpoint/2010/main" val="2475599905"/>
+      </p:ext>
+    </p:extLst>
+  </p:cSld>
+  <p:clrMapOvr>
+    <a:masterClrMapping/>
+  </p:clrMapOvr>
+</p:sld>
+</file>
+
 <file path=ppt/slides/slide6.xml><?xml version="1.0" encoding="utf-8"?>
 <p:sld xmlns:a="http://schemas.openxmlformats.org/drawingml/2006/main" xmlns:r="http://schemas.openxmlformats.org/officeDocument/2006/relationships" xmlns:p="http://schemas.openxmlformats.org/presentationml/2006/main">
   <p:cSld>
@@ -24794,7 +24769,7 @@
         <p:spPr>
           <a:xfrm>
             <a:off x="838199" y="1690688"/>
-            <a:ext cx="4413271" cy="646331"/>
+            <a:ext cx="5075833" cy="646331"/>
           </a:xfrm>
           <a:prstGeom prst="rect">
             <a:avLst/>
@@ -24827,6 +24802,8 @@
               <a:rPr lang="en-US" dirty="0"/>
               <a:t> at </a:t>
             </a:r>
+          </a:p>
+          <a:p>
             <a:r>
               <a:rPr lang="en-US" dirty="0" err="1"/>
               <a:t>hver</a:t>
@@ -24836,7 +24813,7 @@
               <a:t> node </a:t>
             </a:r>
             <a:r>
-              <a:rPr lang="en-US" dirty="0" err="1"/>
+              <a:rPr lang="en-US" b="1" dirty="0" err="1"/>
               <a:t>kun</a:t>
             </a:r>
             <a:r>
@@ -24849,7 +24826,15 @@
             </a:r>
             <a:r>
               <a:rPr lang="en-US" dirty="0"/>
-              <a:t> 2 </a:t>
+              <a:t> </a:t>
+            </a:r>
+            <a:r>
+              <a:rPr lang="en-US" b="1" dirty="0"/>
+              <a:t>2</a:t>
+            </a:r>
+            <a:r>
+              <a:rPr lang="en-US" dirty="0"/>
+              <a:t> </a:t>
             </a:r>
             <a:r>
               <a:rPr lang="en-US" dirty="0" err="1"/>

</xml_diff>